<commit_message>
Added Snackbar to Alerts Tutorial. Updated Slides
</commit_message>
<xml_diff>
--- a/android/alerts/doc/slides.pptx
+++ b/android/alerts/doc/slides.pptx
@@ -5,13 +5,14 @@
     <p:sldMasterId id="2147483660" r:id="rId1"/>
   </p:sldMasterIdLst>
   <p:notesMasterIdLst>
-    <p:notesMasterId r:id="rId6"/>
+    <p:notesMasterId r:id="rId7"/>
   </p:notesMasterIdLst>
   <p:sldIdLst>
     <p:sldId id="256" r:id="rId2"/>
     <p:sldId id="257" r:id="rId3"/>
-    <p:sldId id="259" r:id="rId4"/>
-    <p:sldId id="258" r:id="rId5"/>
+    <p:sldId id="260" r:id="rId4"/>
+    <p:sldId id="259" r:id="rId5"/>
+    <p:sldId id="258" r:id="rId6"/>
   </p:sldIdLst>
   <p:sldSz cx="12192000" cy="6858000"/>
   <p:notesSz cx="6858000" cy="9144000"/>
@@ -200,7 +201,7 @@
           <a:p>
             <a:fld id="{2BE7D458-306E-47D8-9AE4-358101C7CA96}" type="datetimeFigureOut">
               <a:rPr lang="en-US" smtClean="0"/>
-              <a:t>8/6/2015</a:t>
+              <a:t>8/23/2015</a:t>
             </a:fld>
             <a:endParaRPr lang="en-US"/>
           </a:p>
@@ -542,7 +543,7 @@
     </p:spTree>
     <p:extLst>
       <p:ext uri="{BB962C8B-B14F-4D97-AF65-F5344CB8AC3E}">
-        <p14:creationId xmlns:p14="http://schemas.microsoft.com/office/powerpoint/2010/main" val="2613721989"/>
+        <p14:creationId xmlns:p14="http://schemas.microsoft.com/office/powerpoint/2010/main" val="471140189"/>
       </p:ext>
     </p:extLst>
   </p:cSld>
@@ -618,6 +619,90 @@
             <a:fld id="{AA2C388E-1E99-4722-A259-C8FBDAD17B09}" type="slidenum">
               <a:rPr lang="en-US" smtClean="0"/>
               <a:t>4</a:t>
+            </a:fld>
+            <a:endParaRPr lang="en-US"/>
+          </a:p>
+        </p:txBody>
+      </p:sp>
+    </p:spTree>
+    <p:extLst>
+      <p:ext uri="{BB962C8B-B14F-4D97-AF65-F5344CB8AC3E}">
+        <p14:creationId xmlns:p14="http://schemas.microsoft.com/office/powerpoint/2010/main" val="2613721989"/>
+      </p:ext>
+    </p:extLst>
+  </p:cSld>
+  <p:clrMapOvr>
+    <a:masterClrMapping/>
+  </p:clrMapOvr>
+</p:notes>
+</file>
+
+<file path=ppt/notesSlides/notesSlide3.xml><?xml version="1.0" encoding="utf-8"?>
+<p:notes xmlns:a="http://schemas.openxmlformats.org/drawingml/2006/main" xmlns:r="http://schemas.openxmlformats.org/officeDocument/2006/relationships" xmlns:p="http://schemas.openxmlformats.org/presentationml/2006/main">
+  <p:cSld>
+    <p:spTree>
+      <p:nvGrpSpPr>
+        <p:cNvPr id="1" name=""/>
+        <p:cNvGrpSpPr/>
+        <p:nvPr/>
+      </p:nvGrpSpPr>
+      <p:grpSpPr>
+        <a:xfrm>
+          <a:off x="0" y="0"/>
+          <a:ext cx="0" cy="0"/>
+          <a:chOff x="0" y="0"/>
+          <a:chExt cx="0" cy="0"/>
+        </a:xfrm>
+      </p:grpSpPr>
+      <p:sp>
+        <p:nvSpPr>
+          <p:cNvPr id="2" name="Slide Image Placeholder 1"/>
+          <p:cNvSpPr>
+            <a:spLocks noGrp="1" noRot="1" noChangeAspect="1"/>
+          </p:cNvSpPr>
+          <p:nvPr>
+            <p:ph type="sldImg"/>
+          </p:nvPr>
+        </p:nvSpPr>
+        <p:spPr/>
+      </p:sp>
+      <p:sp>
+        <p:nvSpPr>
+          <p:cNvPr id="3" name="Notes Placeholder 2"/>
+          <p:cNvSpPr>
+            <a:spLocks noGrp="1"/>
+          </p:cNvSpPr>
+          <p:nvPr>
+            <p:ph type="body" idx="1"/>
+          </p:nvPr>
+        </p:nvSpPr>
+        <p:spPr/>
+        <p:txBody>
+          <a:bodyPr/>
+          <a:lstStyle/>
+          <a:p>
+            <a:endParaRPr lang="en-US"/>
+          </a:p>
+        </p:txBody>
+      </p:sp>
+      <p:sp>
+        <p:nvSpPr>
+          <p:cNvPr id="4" name="Slide Number Placeholder 3"/>
+          <p:cNvSpPr>
+            <a:spLocks noGrp="1"/>
+          </p:cNvSpPr>
+          <p:nvPr>
+            <p:ph type="sldNum" sz="quarter" idx="10"/>
+          </p:nvPr>
+        </p:nvSpPr>
+        <p:spPr/>
+        <p:txBody>
+          <a:bodyPr/>
+          <a:lstStyle/>
+          <a:p>
+            <a:fld id="{AA2C388E-1E99-4722-A259-C8FBDAD17B09}" type="slidenum">
+              <a:rPr lang="en-US" smtClean="0"/>
+              <a:t>5</a:t>
             </a:fld>
             <a:endParaRPr lang="en-US"/>
           </a:p>
@@ -790,7 +875,7 @@
           <a:p>
             <a:r>
               <a:rPr lang="en-US" smtClean="0"/>
-              <a:t>/  4</a:t>
+              <a:t>/  5</a:t>
             </a:r>
             <a:endParaRPr lang="en-US"/>
           </a:p>
@@ -964,7 +1049,7 @@
           <a:p>
             <a:r>
               <a:rPr lang="en-US" smtClean="0"/>
-              <a:t>/  4</a:t>
+              <a:t>/  5</a:t>
             </a:r>
             <a:endParaRPr lang="en-US"/>
           </a:p>
@@ -1148,7 +1233,7 @@
           <a:p>
             <a:r>
               <a:rPr lang="en-US" smtClean="0"/>
-              <a:t>/  4</a:t>
+              <a:t>/  5</a:t>
             </a:r>
             <a:endParaRPr lang="en-US"/>
           </a:p>
@@ -1358,7 +1443,7 @@
           <a:p>
             <a:r>
               <a:rPr lang="en-US" smtClean="0"/>
-              <a:t>/  4</a:t>
+              <a:t>/  5</a:t>
             </a:r>
             <a:endParaRPr lang="en-US"/>
           </a:p>
@@ -1630,7 +1715,7 @@
           <a:p>
             <a:r>
               <a:rPr lang="en-US" smtClean="0"/>
-              <a:t>/  4</a:t>
+              <a:t>/  5</a:t>
             </a:r>
             <a:endParaRPr lang="en-US"/>
           </a:p>
@@ -1866,7 +1951,7 @@
           <a:p>
             <a:r>
               <a:rPr lang="en-US" smtClean="0"/>
-              <a:t>/  4</a:t>
+              <a:t>/  5</a:t>
             </a:r>
             <a:endParaRPr lang="en-US"/>
           </a:p>
@@ -2237,7 +2322,7 @@
           <a:p>
             <a:r>
               <a:rPr lang="en-US" smtClean="0"/>
-              <a:t>/  4</a:t>
+              <a:t>/  5</a:t>
             </a:r>
             <a:endParaRPr lang="en-US"/>
           </a:p>
@@ -2359,7 +2444,7 @@
           <a:p>
             <a:r>
               <a:rPr lang="en-US" smtClean="0"/>
-              <a:t>/  4</a:t>
+              <a:t>/  5</a:t>
             </a:r>
             <a:endParaRPr lang="en-US"/>
           </a:p>
@@ -2458,7 +2543,7 @@
           <a:p>
             <a:r>
               <a:rPr lang="en-US" smtClean="0"/>
-              <a:t>/  4</a:t>
+              <a:t>/  5</a:t>
             </a:r>
             <a:endParaRPr lang="en-US"/>
           </a:p>
@@ -2739,7 +2824,7 @@
           <a:p>
             <a:r>
               <a:rPr lang="en-US" smtClean="0"/>
-              <a:t>/  4</a:t>
+              <a:t>/  5</a:t>
             </a:r>
             <a:endParaRPr lang="en-US"/>
           </a:p>
@@ -3000,7 +3085,7 @@
           <a:p>
             <a:r>
               <a:rPr lang="en-US" smtClean="0"/>
-              <a:t>/  4</a:t>
+              <a:t>/  5</a:t>
             </a:r>
             <a:endParaRPr lang="en-US"/>
           </a:p>
@@ -3235,7 +3320,7 @@
           <a:p>
             <a:r>
               <a:rPr lang="en-US" smtClean="0"/>
-              <a:t>/  4</a:t>
+              <a:t>/  5</a:t>
             </a:r>
             <a:endParaRPr lang="en-US"/>
           </a:p>
@@ -3639,7 +3724,9 @@
         </p:nvSpPr>
         <p:spPr/>
         <p:txBody>
-          <a:bodyPr/>
+          <a:bodyPr>
+            <a:normAutofit lnSpcReduction="10000"/>
+          </a:bodyPr>
           <a:lstStyle/>
           <a:p>
             <a:pPr marL="495300" indent="-457200">
@@ -3653,8 +3740,21 @@
             </a:pPr>
             <a:r>
               <a:rPr lang="en" sz="3200" dirty="0"/>
-              <a:t>App shows two different kinds of alerts: AlertDialog and Toast.</a:t>
-            </a:r>
+              <a:t>App shows </a:t>
+            </a:r>
+            <a:r>
+              <a:rPr lang="en" sz="3200" dirty="0" smtClean="0"/>
+              <a:t>three </a:t>
+            </a:r>
+            <a:r>
+              <a:rPr lang="en" sz="3200" dirty="0"/>
+              <a:t>different kinds of alerts: </a:t>
+            </a:r>
+            <a:r>
+              <a:rPr lang="en" sz="3200" dirty="0" smtClean="0"/>
+              <a:t>AlertDialog, Toast and Snackbar</a:t>
+            </a:r>
+            <a:endParaRPr lang="en" sz="3200" dirty="0"/>
           </a:p>
           <a:p>
             <a:pPr marL="495300" indent="-457200">
@@ -3743,7 +3843,90 @@
             </a:pPr>
             <a:r>
               <a:rPr lang="en" sz="2800" dirty="0"/>
-              <a:t>Toasts are automatically removed</a:t>
+              <a:t>Toasts are automatically </a:t>
+            </a:r>
+            <a:r>
+              <a:rPr lang="en" sz="2800" dirty="0" smtClean="0"/>
+              <a:t>removed</a:t>
+            </a:r>
+          </a:p>
+          <a:p>
+            <a:pPr marL="419100" indent="-342900">
+              <a:spcBef>
+                <a:spcPts val="0"/>
+              </a:spcBef>
+              <a:buClr>
+                <a:schemeClr val="dk1"/>
+              </a:buClr>
+              <a:buSzPct val="80000"/>
+            </a:pPr>
+            <a:r>
+              <a:rPr lang="en" sz="3200" dirty="0" smtClean="0"/>
+              <a:t>Snackbar</a:t>
+            </a:r>
+          </a:p>
+          <a:p>
+            <a:pPr marL="876300" lvl="1" indent="-342900">
+              <a:spcBef>
+                <a:spcPts val="0"/>
+              </a:spcBef>
+              <a:buClr>
+                <a:schemeClr val="dk1"/>
+              </a:buClr>
+              <a:buSzPct val="80000"/>
+            </a:pPr>
+            <a:r>
+              <a:rPr lang="en" dirty="0" smtClean="0"/>
+              <a:t>Short text message that can be displayed for a few seconds or indefinitely.</a:t>
+            </a:r>
+          </a:p>
+          <a:p>
+            <a:pPr marL="876300" lvl="1" indent="-342900">
+              <a:spcBef>
+                <a:spcPts val="0"/>
+              </a:spcBef>
+              <a:buClr>
+                <a:schemeClr val="dk1"/>
+              </a:buClr>
+              <a:buSzPct val="80000"/>
+            </a:pPr>
+            <a:r>
+              <a:rPr lang="en" dirty="0" smtClean="0"/>
+              <a:t>Snackbars are automatically removed unless LENGTH_INDEFINTIE is used.</a:t>
+            </a:r>
+          </a:p>
+          <a:p>
+            <a:pPr marL="1333500" lvl="2" indent="-342900">
+              <a:spcBef>
+                <a:spcPts val="0"/>
+              </a:spcBef>
+              <a:buClr>
+                <a:schemeClr val="dk1"/>
+              </a:buClr>
+              <a:buSzPct val="80000"/>
+            </a:pPr>
+            <a:r>
+              <a:rPr lang="en-US" dirty="0" smtClean="0"/>
+              <a:t>I</a:t>
+            </a:r>
+            <a:r>
+              <a:rPr lang="en" dirty="0" smtClean="0"/>
+              <a:t>f LENGTH_INDEFINTIE is used, snackbars must be removed by an Action</a:t>
+            </a:r>
+          </a:p>
+          <a:p>
+            <a:pPr marL="876300" lvl="1" indent="-342900">
+              <a:spcBef>
+                <a:spcPts val="0"/>
+              </a:spcBef>
+              <a:buClr>
+                <a:schemeClr val="dk1"/>
+              </a:buClr>
+              <a:buSzPct val="80000"/>
+            </a:pPr>
+            <a:r>
+              <a:rPr lang="en" dirty="0" smtClean="0"/>
+              <a:t>Unlike Toasts, Snackbars can have Actions</a:t>
             </a:r>
           </a:p>
           <a:p>
@@ -3794,7 +3977,7 @@
           <a:p>
             <a:r>
               <a:rPr lang="en-US" smtClean="0"/>
-              <a:t>/  4</a:t>
+              <a:t>/  5</a:t>
             </a:r>
             <a:endParaRPr lang="en-US"/>
           </a:p>
@@ -3893,7 +4076,7 @@
           <a:p>
             <a:r>
               <a:rPr lang="en-US" smtClean="0"/>
-              <a:t>/  4</a:t>
+              <a:t>/  5</a:t>
             </a:r>
             <a:endParaRPr lang="en-US"/>
           </a:p>
@@ -3986,7 +4169,7 @@
       </p:sp>
       <p:pic>
         <p:nvPicPr>
-          <p:cNvPr id="2" name="Picture 1"/>
+          <p:cNvPr id="7" name="Picture 6"/>
           <p:cNvPicPr>
             <a:picLocks noChangeAspect="1"/>
           </p:cNvPicPr>
@@ -4006,8 +4189,8 @@
         </p:blipFill>
         <p:spPr>
           <a:xfrm>
-            <a:off x="2020142" y="365125"/>
-            <a:ext cx="2767204" cy="4919472"/>
+            <a:off x="1989281" y="365125"/>
+            <a:ext cx="2828925" cy="5029200"/>
           </a:xfrm>
           <a:prstGeom prst="rect">
             <a:avLst/>
@@ -4016,7 +4199,7 @@
       </p:pic>
       <p:pic>
         <p:nvPicPr>
-          <p:cNvPr id="3" name="Picture 2"/>
+          <p:cNvPr id="8" name="Picture 7"/>
           <p:cNvPicPr>
             <a:picLocks noChangeAspect="1"/>
           </p:cNvPicPr>
@@ -4036,8 +4219,8 @@
         </p:blipFill>
         <p:spPr>
           <a:xfrm>
-            <a:off x="6746747" y="365125"/>
-            <a:ext cx="2776728" cy="4936408"/>
+            <a:off x="6720648" y="365125"/>
+            <a:ext cx="2828925" cy="5029200"/>
           </a:xfrm>
           <a:prstGeom prst="rect">
             <a:avLst/>
@@ -4076,63 +4259,6 @@
       </p:grpSpPr>
       <p:sp>
         <p:nvSpPr>
-          <p:cNvPr id="2" name="Title 1"/>
-          <p:cNvSpPr>
-            <a:spLocks noGrp="1"/>
-          </p:cNvSpPr>
-          <p:nvPr>
-            <p:ph type="title"/>
-          </p:nvPr>
-        </p:nvSpPr>
-        <p:spPr/>
-        <p:txBody>
-          <a:bodyPr/>
-          <a:lstStyle/>
-          <a:p>
-            <a:r>
-              <a:rPr lang="en-US" dirty="0" smtClean="0"/>
-              <a:t>References</a:t>
-            </a:r>
-            <a:endParaRPr lang="en-US" dirty="0"/>
-          </a:p>
-        </p:txBody>
-      </p:sp>
-      <p:sp>
-        <p:nvSpPr>
-          <p:cNvPr id="3" name="Content Placeholder 2"/>
-          <p:cNvSpPr>
-            <a:spLocks noGrp="1"/>
-          </p:cNvSpPr>
-          <p:nvPr>
-            <p:ph idx="1"/>
-          </p:nvPr>
-        </p:nvSpPr>
-        <p:spPr/>
-        <p:txBody>
-          <a:bodyPr/>
-          <a:lstStyle/>
-          <a:p>
-            <a:r>
-              <a:rPr lang="en-US" dirty="0" smtClean="0">
-                <a:hlinkClick r:id="rId3"/>
-              </a:rPr>
-              <a:t>Toasts</a:t>
-            </a:r>
-            <a:endParaRPr lang="en-US" dirty="0" smtClean="0"/>
-          </a:p>
-          <a:p>
-            <a:r>
-              <a:rPr lang="en-US" dirty="0" smtClean="0">
-                <a:hlinkClick r:id="rId4"/>
-              </a:rPr>
-              <a:t>Dialogs</a:t>
-            </a:r>
-            <a:endParaRPr lang="en-US" dirty="0"/>
-          </a:p>
-        </p:txBody>
-      </p:sp>
-      <p:sp>
-        <p:nvSpPr>
           <p:cNvPr id="4" name="Date Placeholder 3"/>
           <p:cNvSpPr>
             <a:spLocks noGrp="1"/>
@@ -4171,7 +4297,7 @@
           <a:p>
             <a:r>
               <a:rPr lang="en-US" smtClean="0"/>
-              <a:t>/  4</a:t>
+              <a:t>/  5</a:t>
             </a:r>
             <a:endParaRPr lang="en-US"/>
           </a:p>
@@ -4197,13 +4323,139 @@
               <a:t>3</a:t>
             </a:fld>
             <a:endParaRPr lang="en-US"/>
+          </a:p>
+        </p:txBody>
+      </p:sp>
+      <p:pic>
+        <p:nvPicPr>
+          <p:cNvPr id="7" name="Picture 6"/>
+          <p:cNvPicPr>
+            <a:picLocks noChangeAspect="1"/>
+          </p:cNvPicPr>
+          <p:nvPr/>
+        </p:nvPicPr>
+        <p:blipFill>
+          <a:blip r:embed="rId3" cstate="print">
+            <a:extLst>
+              <a:ext uri="{28A0092B-C50C-407E-A947-70E740481C1C}">
+                <a14:useLocalDpi xmlns:a14="http://schemas.microsoft.com/office/drawing/2010/main" val="0"/>
+              </a:ext>
+            </a:extLst>
+          </a:blip>
+          <a:stretch>
+            <a:fillRect/>
+          </a:stretch>
+        </p:blipFill>
+        <p:spPr>
+          <a:xfrm>
+            <a:off x="1993392" y="365125"/>
+            <a:ext cx="2828925" cy="5029200"/>
+          </a:xfrm>
+          <a:prstGeom prst="rect">
+            <a:avLst/>
+          </a:prstGeom>
+        </p:spPr>
+      </p:pic>
+      <p:pic>
+        <p:nvPicPr>
+          <p:cNvPr id="8" name="Picture 7"/>
+          <p:cNvPicPr>
+            <a:picLocks noChangeAspect="1"/>
+          </p:cNvPicPr>
+          <p:nvPr/>
+        </p:nvPicPr>
+        <p:blipFill>
+          <a:blip r:embed="rId4" cstate="print">
+            <a:extLst>
+              <a:ext uri="{28A0092B-C50C-407E-A947-70E740481C1C}">
+                <a14:useLocalDpi xmlns:a14="http://schemas.microsoft.com/office/drawing/2010/main" val="0"/>
+              </a:ext>
+            </a:extLst>
+          </a:blip>
+          <a:stretch>
+            <a:fillRect/>
+          </a:stretch>
+        </p:blipFill>
+        <p:spPr>
+          <a:xfrm>
+            <a:off x="6720840" y="365125"/>
+            <a:ext cx="2828925" cy="5029200"/>
+          </a:xfrm>
+          <a:prstGeom prst="rect">
+            <a:avLst/>
+          </a:prstGeom>
+        </p:spPr>
+      </p:pic>
+      <p:sp>
+        <p:nvSpPr>
+          <p:cNvPr id="9" name="TextBox 8"/>
+          <p:cNvSpPr txBox="1"/>
+          <p:nvPr/>
+        </p:nvSpPr>
+        <p:spPr>
+          <a:xfrm>
+            <a:off x="2147090" y="5523346"/>
+            <a:ext cx="2521527" cy="369332"/>
+          </a:xfrm>
+          <a:prstGeom prst="rect">
+            <a:avLst/>
+          </a:prstGeom>
+          <a:noFill/>
+        </p:spPr>
+        <p:txBody>
+          <a:bodyPr wrap="square" rtlCol="0">
+            <a:spAutoFit/>
+          </a:bodyPr>
+          <a:lstStyle/>
+          <a:p>
+            <a:pPr algn="ctr"/>
+            <a:r>
+              <a:rPr lang="en-US" dirty="0" err="1" smtClean="0"/>
+              <a:t>Snackbar</a:t>
+            </a:r>
+            <a:endParaRPr lang="en-US" dirty="0"/>
+          </a:p>
+        </p:txBody>
+      </p:sp>
+      <p:sp>
+        <p:nvSpPr>
+          <p:cNvPr id="10" name="TextBox 9"/>
+          <p:cNvSpPr txBox="1"/>
+          <p:nvPr/>
+        </p:nvSpPr>
+        <p:spPr>
+          <a:xfrm>
+            <a:off x="6874538" y="5523346"/>
+            <a:ext cx="2521527" cy="369332"/>
+          </a:xfrm>
+          <a:prstGeom prst="rect">
+            <a:avLst/>
+          </a:prstGeom>
+          <a:noFill/>
+        </p:spPr>
+        <p:txBody>
+          <a:bodyPr wrap="square" rtlCol="0">
+            <a:spAutoFit/>
+          </a:bodyPr>
+          <a:lstStyle/>
+          <a:p>
+            <a:pPr algn="ctr"/>
+            <a:r>
+              <a:rPr lang="en-US" dirty="0" err="1" smtClean="0"/>
+              <a:t>Snackbar</a:t>
+            </a:r>
+            <a:r>
+              <a:rPr lang="en-US" dirty="0" smtClean="0"/>
+              <a:t> Dismissed</a:t>
+            </a:r>
+            <a:endParaRPr lang="en-US" dirty="0"/>
           </a:p>
         </p:txBody>
       </p:sp>
     </p:spTree>
     <p:extLst>
       <p:ext uri="{BB962C8B-B14F-4D97-AF65-F5344CB8AC3E}">
-        <p14:creationId xmlns:p14="http://schemas.microsoft.com/office/powerpoint/2010/main" val="2538998327"/>
+        <p14:creationId xmlns:p14="http://schemas.microsoft.com/office/powerpoint/2010/main" val="2532351279"/>
       </p:ext>
     </p:extLst>
   </p:cSld>
@@ -4247,6 +4499,186 @@
           <a:p>
             <a:r>
               <a:rPr lang="en-US" dirty="0" smtClean="0"/>
+              <a:t>References</a:t>
+            </a:r>
+            <a:endParaRPr lang="en-US" dirty="0"/>
+          </a:p>
+        </p:txBody>
+      </p:sp>
+      <p:sp>
+        <p:nvSpPr>
+          <p:cNvPr id="3" name="Content Placeholder 2"/>
+          <p:cNvSpPr>
+            <a:spLocks noGrp="1"/>
+          </p:cNvSpPr>
+          <p:nvPr>
+            <p:ph idx="1"/>
+          </p:nvPr>
+        </p:nvSpPr>
+        <p:spPr/>
+        <p:txBody>
+          <a:bodyPr/>
+          <a:lstStyle/>
+          <a:p>
+            <a:r>
+              <a:rPr lang="en-US" dirty="0" smtClean="0">
+                <a:hlinkClick r:id="rId3"/>
+              </a:rPr>
+              <a:t>Toasts</a:t>
+            </a:r>
+            <a:endParaRPr lang="en-US" dirty="0" smtClean="0"/>
+          </a:p>
+          <a:p>
+            <a:r>
+              <a:rPr lang="en-US" dirty="0" smtClean="0">
+                <a:hlinkClick r:id="rId4"/>
+              </a:rPr>
+              <a:t>Dialogs</a:t>
+            </a:r>
+            <a:endParaRPr lang="en-US" dirty="0" smtClean="0"/>
+          </a:p>
+          <a:p>
+            <a:r>
+              <a:rPr lang="en-US" dirty="0" err="1" smtClean="0">
+                <a:hlinkClick r:id="rId5"/>
+              </a:rPr>
+              <a:t>Snackbar</a:t>
+            </a:r>
+            <a:endParaRPr lang="en-US" dirty="0" smtClean="0"/>
+          </a:p>
+          <a:p>
+            <a:r>
+              <a:rPr lang="en-US" dirty="0" err="1" smtClean="0">
+                <a:hlinkClick r:id="rId6"/>
+              </a:rPr>
+              <a:t>Snackbar</a:t>
+            </a:r>
+            <a:r>
+              <a:rPr lang="en-US" dirty="0" smtClean="0">
+                <a:hlinkClick r:id="rId6"/>
+              </a:rPr>
+              <a:t> And Toast Material Design</a:t>
+            </a:r>
+            <a:endParaRPr lang="en-US" dirty="0"/>
+          </a:p>
+        </p:txBody>
+      </p:sp>
+      <p:sp>
+        <p:nvSpPr>
+          <p:cNvPr id="4" name="Date Placeholder 3"/>
+          <p:cNvSpPr>
+            <a:spLocks noGrp="1"/>
+          </p:cNvSpPr>
+          <p:nvPr>
+            <p:ph type="dt" sz="half" idx="10"/>
+          </p:nvPr>
+        </p:nvSpPr>
+        <p:spPr/>
+        <p:txBody>
+          <a:bodyPr/>
+          <a:lstStyle/>
+          <a:p>
+            <a:r>
+              <a:rPr lang="en-US" smtClean="0"/>
+              <a:t>tutorial/android/alerts</a:t>
+            </a:r>
+            <a:endParaRPr lang="en-US"/>
+          </a:p>
+        </p:txBody>
+      </p:sp>
+      <p:sp>
+        <p:nvSpPr>
+          <p:cNvPr id="5" name="Footer Placeholder 4"/>
+          <p:cNvSpPr>
+            <a:spLocks noGrp="1"/>
+          </p:cNvSpPr>
+          <p:nvPr>
+            <p:ph type="ftr" sz="quarter" idx="11"/>
+          </p:nvPr>
+        </p:nvSpPr>
+        <p:spPr/>
+        <p:txBody>
+          <a:bodyPr/>
+          <a:lstStyle/>
+          <a:p>
+            <a:r>
+              <a:rPr lang="en-US" smtClean="0"/>
+              <a:t>/  5</a:t>
+            </a:r>
+            <a:endParaRPr lang="en-US"/>
+          </a:p>
+        </p:txBody>
+      </p:sp>
+      <p:sp>
+        <p:nvSpPr>
+          <p:cNvPr id="6" name="Slide Number Placeholder 5"/>
+          <p:cNvSpPr>
+            <a:spLocks noGrp="1"/>
+          </p:cNvSpPr>
+          <p:nvPr>
+            <p:ph type="sldNum" sz="quarter" idx="12"/>
+          </p:nvPr>
+        </p:nvSpPr>
+        <p:spPr/>
+        <p:txBody>
+          <a:bodyPr/>
+          <a:lstStyle/>
+          <a:p>
+            <a:fld id="{EF942A5F-0CCD-45C8-A5BE-C1602BE187D0}" type="slidenum">
+              <a:rPr lang="en-US" smtClean="0"/>
+              <a:t>4</a:t>
+            </a:fld>
+            <a:endParaRPr lang="en-US"/>
+          </a:p>
+        </p:txBody>
+      </p:sp>
+    </p:spTree>
+    <p:extLst>
+      <p:ext uri="{BB962C8B-B14F-4D97-AF65-F5344CB8AC3E}">
+        <p14:creationId xmlns:p14="http://schemas.microsoft.com/office/powerpoint/2010/main" val="2538998327"/>
+      </p:ext>
+    </p:extLst>
+  </p:cSld>
+  <p:clrMapOvr>
+    <a:masterClrMapping/>
+  </p:clrMapOvr>
+</p:sld>
+</file>
+
+<file path=ppt/slides/slide5.xml><?xml version="1.0" encoding="utf-8"?>
+<p:sld xmlns:a="http://schemas.openxmlformats.org/drawingml/2006/main" xmlns:r="http://schemas.openxmlformats.org/officeDocument/2006/relationships" xmlns:p="http://schemas.openxmlformats.org/presentationml/2006/main">
+  <p:cSld>
+    <p:spTree>
+      <p:nvGrpSpPr>
+        <p:cNvPr id="1" name=""/>
+        <p:cNvGrpSpPr/>
+        <p:nvPr/>
+      </p:nvGrpSpPr>
+      <p:grpSpPr>
+        <a:xfrm>
+          <a:off x="0" y="0"/>
+          <a:ext cx="0" cy="0"/>
+          <a:chOff x="0" y="0"/>
+          <a:chExt cx="0" cy="0"/>
+        </a:xfrm>
+      </p:grpSpPr>
+      <p:sp>
+        <p:nvSpPr>
+          <p:cNvPr id="2" name="Title 1"/>
+          <p:cNvSpPr>
+            <a:spLocks noGrp="1"/>
+          </p:cNvSpPr>
+          <p:nvPr>
+            <p:ph type="title"/>
+          </p:nvPr>
+        </p:nvSpPr>
+        <p:spPr/>
+        <p:txBody>
+          <a:bodyPr/>
+          <a:lstStyle/>
+          <a:p>
+            <a:r>
+              <a:rPr lang="en-US" dirty="0" smtClean="0"/>
               <a:t>Exercise</a:t>
             </a:r>
             <a:endParaRPr lang="en-US" dirty="0"/>
@@ -4316,7 +4748,7 @@
           <a:p>
             <a:r>
               <a:rPr lang="en-US" smtClean="0"/>
-              <a:t>/  4</a:t>
+              <a:t>/  5</a:t>
             </a:r>
             <a:endParaRPr lang="en-US"/>
           </a:p>
@@ -4339,7 +4771,7 @@
           <a:p>
             <a:fld id="{EF942A5F-0CCD-45C8-A5BE-C1602BE187D0}" type="slidenum">
               <a:rPr lang="en-US" smtClean="0"/>
-              <a:t>4</a:t>
+              <a:t>5</a:t>
             </a:fld>
             <a:endParaRPr lang="en-US"/>
           </a:p>

</xml_diff>